<commit_message>
Separação da implementação das classes No
</commit_message>
<xml_diff>
--- a/apresentacoes/Aula4/Etapa1/Etapa1.pptx
+++ b/apresentacoes/Aula4/Etapa1/Etapa1.pptx
@@ -289,7 +289,7 @@
       </p15:sldGuideLst>
     </p:ext>
     <p:ext uri="http://customooxmlschemas.google.com/">
-      <go:slidesCustomData xmlns:go="http://customooxmlschemas.google.com/" xmlns:ahyp="http://schemas.microsoft.com/office/drawing/2018/hyperlinkcolor" xmlns:p15="http://schemas.microsoft.com/office/powerpoint/2012/main" xmlns:p14="http://schemas.microsoft.com/office/powerpoint/2010/main" xmlns:com="http://schemas.openxmlformats.org/drawingml/2006/compatibility" xmlns:pvml="urn:schemas-microsoft-com:office:powerpoint" xmlns:v="urn:schemas-microsoft-com:vml" xmlns:o="urn:schemas-microsoft-com:office:office" xmlns:dgm="http://schemas.openxmlformats.org/drawingml/2006/diagram" xmlns:c="http://schemas.openxmlformats.org/drawingml/2006/chart" xmlns:mv="urn:schemas-microsoft-com:mac:vml" xmlns:mc="http://schemas.openxmlformats.org/markup-compatibility/2006" xmlns="" r:id="rId34" roundtripDataSignature="AMtx7mij1fsZUe5V3lBG5qQcqOvrI5UhJw=="/>
+      <go:slidesCustomData xmlns="" xmlns:mc="http://schemas.openxmlformats.org/markup-compatibility/2006" xmlns:mv="urn:schemas-microsoft-com:mac:vml" xmlns:c="http://schemas.openxmlformats.org/drawingml/2006/chart" xmlns:dgm="http://schemas.openxmlformats.org/drawingml/2006/diagram" xmlns:o="urn:schemas-microsoft-com:office:office" xmlns:v="urn:schemas-microsoft-com:vml" xmlns:pvml="urn:schemas-microsoft-com:office:powerpoint" xmlns:com="http://schemas.openxmlformats.org/drawingml/2006/compatibility" xmlns:p14="http://schemas.microsoft.com/office/powerpoint/2010/main" xmlns:p15="http://schemas.microsoft.com/office/powerpoint/2012/main" xmlns:ahyp="http://schemas.microsoft.com/office/drawing/2018/hyperlinkcolor" xmlns:go="http://customooxmlschemas.google.com/" r:id="rId34" roundtripDataSignature="AMtx7mij1fsZUe5V3lBG5qQcqOvrI5UhJw=="/>
     </p:ext>
   </p:extLst>
 </p:presentation>
@@ -21552,7 +21552,7 @@
         <p:fade/>
       </p:transition>
     </mc:Choice>
-    <mc:Fallback xmlns="" xmlns:mv="urn:schemas-microsoft-com:mac:vml" xmlns:c="http://schemas.openxmlformats.org/drawingml/2006/chart" xmlns:dgm="http://schemas.openxmlformats.org/drawingml/2006/diagram" xmlns:o="urn:schemas-microsoft-com:office:office" xmlns:v="urn:schemas-microsoft-com:vml" xmlns:pvml="urn:schemas-microsoft-com:office:powerpoint" xmlns:com="http://schemas.openxmlformats.org/drawingml/2006/compatibility" xmlns:p15="http://schemas.microsoft.com/office/powerpoint/2012/main" xmlns:ahyp="http://schemas.microsoft.com/office/drawing/2018/hyperlinkcolor">
+    <mc:Fallback xmlns:ahyp="http://schemas.microsoft.com/office/drawing/2018/hyperlinkcolor" xmlns:p15="http://schemas.microsoft.com/office/powerpoint/2012/main" xmlns:com="http://schemas.openxmlformats.org/drawingml/2006/compatibility" xmlns:pvml="urn:schemas-microsoft-com:office:powerpoint" xmlns:v="urn:schemas-microsoft-com:vml" xmlns:o="urn:schemas-microsoft-com:office:office" xmlns:dgm="http://schemas.openxmlformats.org/drawingml/2006/diagram" xmlns:c="http://schemas.openxmlformats.org/drawingml/2006/chart" xmlns:mv="urn:schemas-microsoft-com:mac:vml" xmlns="">
       <p:transition spd="slow">
         <p:fade/>
       </p:transition>
@@ -22132,7 +22132,7 @@
         <p:fade/>
       </p:transition>
     </mc:Choice>
-    <mc:Fallback xmlns:ahyp="http://schemas.microsoft.com/office/drawing/2018/hyperlinkcolor" xmlns:p15="http://schemas.microsoft.com/office/powerpoint/2012/main" xmlns:com="http://schemas.openxmlformats.org/drawingml/2006/compatibility" xmlns:pvml="urn:schemas-microsoft-com:office:powerpoint" xmlns:v="urn:schemas-microsoft-com:vml" xmlns:o="urn:schemas-microsoft-com:office:office" xmlns:dgm="http://schemas.openxmlformats.org/drawingml/2006/diagram" xmlns:c="http://schemas.openxmlformats.org/drawingml/2006/chart" xmlns:mv="urn:schemas-microsoft-com:mac:vml" xmlns="">
+    <mc:Fallback xmlns="" xmlns:mv="urn:schemas-microsoft-com:mac:vml" xmlns:c="http://schemas.openxmlformats.org/drawingml/2006/chart" xmlns:dgm="http://schemas.openxmlformats.org/drawingml/2006/diagram" xmlns:o="urn:schemas-microsoft-com:office:office" xmlns:v="urn:schemas-microsoft-com:vml" xmlns:pvml="urn:schemas-microsoft-com:office:powerpoint" xmlns:com="http://schemas.openxmlformats.org/drawingml/2006/compatibility" xmlns:p15="http://schemas.microsoft.com/office/powerpoint/2012/main" xmlns:ahyp="http://schemas.microsoft.com/office/drawing/2018/hyperlinkcolor">
       <p:transition spd="slow">
         <p:fade/>
       </p:transition>
@@ -27823,7 +27823,7 @@
         </p:blipFill>
         <p:spPr>
           <a:xfrm>
-            <a:off x="7196362" y="2461450"/>
+            <a:off x="7196362" y="108547"/>
             <a:ext cx="1938293" cy="2349447"/>
           </a:xfrm>
           <a:prstGeom prst="rect">
@@ -27842,7 +27842,7 @@
         <p:fade/>
       </p:transition>
     </mc:Choice>
-    <mc:Fallback xmlns:ahyp="http://schemas.microsoft.com/office/drawing/2018/hyperlinkcolor" xmlns:p15="http://schemas.microsoft.com/office/powerpoint/2012/main" xmlns:com="http://schemas.openxmlformats.org/drawingml/2006/compatibility" xmlns:pvml="urn:schemas-microsoft-com:office:powerpoint" xmlns:v="urn:schemas-microsoft-com:vml" xmlns:o="urn:schemas-microsoft-com:office:office" xmlns:dgm="http://schemas.openxmlformats.org/drawingml/2006/diagram" xmlns:c="http://schemas.openxmlformats.org/drawingml/2006/chart" xmlns:mv="urn:schemas-microsoft-com:mac:vml" xmlns="">
+    <mc:Fallback xmlns="" xmlns:mv="urn:schemas-microsoft-com:mac:vml" xmlns:c="http://schemas.openxmlformats.org/drawingml/2006/chart" xmlns:dgm="http://schemas.openxmlformats.org/drawingml/2006/diagram" xmlns:o="urn:schemas-microsoft-com:office:office" xmlns:v="urn:schemas-microsoft-com:vml" xmlns:pvml="urn:schemas-microsoft-com:office:powerpoint" xmlns:com="http://schemas.openxmlformats.org/drawingml/2006/compatibility" xmlns:p15="http://schemas.microsoft.com/office/powerpoint/2012/main" xmlns:ahyp="http://schemas.microsoft.com/office/drawing/2018/hyperlinkcolor">
       <p:transition spd="slow">
         <p:fade/>
       </p:transition>

</xml_diff>